<commit_message>
PCB with KiCad done
</commit_message>
<xml_diff>
--- a/optical/report.pptx
+++ b/optical/report.pptx
@@ -121,7 +121,7 @@
 <file path=ppt/revisionInfo.xml><?xml version="1.0" encoding="utf-8"?>
 <p1510:revInfo xmlns:a="http://schemas.openxmlformats.org/drawingml/2006/main" xmlns:r="http://schemas.openxmlformats.org/officeDocument/2006/relationships" xmlns:p1510="http://schemas.microsoft.com/office/powerpoint/2015/10/main">
   <p1510:revLst>
-    <p1510:client id="{75016F44-512C-5341-99A4-0515FCFC0FB3}" v="592" dt="2019-10-26T08:14:53.640"/>
+    <p1510:client id="{75016F44-512C-5341-99A4-0515FCFC0FB3}" v="661" dt="2019-10-26T08:22:38.430"/>
   </p1510:revLst>
 </p1510:revInfo>
 </file>
@@ -195,7 +195,7 @@
   <pc:docChgLst>
     <pc:chgData name="Akash Levy" userId="0f662538-7453-45f3-952a-fc9f1a7c515e" providerId="ADAL" clId="{75016F44-512C-5341-99A4-0515FCFC0FB3}"/>
     <pc:docChg chg="undo custSel mod addSld delSld modSld">
-      <pc:chgData name="Akash Levy" userId="0f662538-7453-45f3-952a-fc9f1a7c515e" providerId="ADAL" clId="{75016F44-512C-5341-99A4-0515FCFC0FB3}" dt="2019-10-26T08:14:53.640" v="1210" actId="931"/>
+      <pc:chgData name="Akash Levy" userId="0f662538-7453-45f3-952a-fc9f1a7c515e" providerId="ADAL" clId="{75016F44-512C-5341-99A4-0515FCFC0FB3}" dt="2019-10-26T08:22:38.430" v="1281" actId="207"/>
       <pc:docMkLst>
         <pc:docMk/>
       </pc:docMkLst>
@@ -238,7 +238,7 @@
         </pc:sldMkLst>
       </pc:sldChg>
       <pc:sldChg chg="addSp delSp modSp delDesignElem">
-        <pc:chgData name="Akash Levy" userId="0f662538-7453-45f3-952a-fc9f1a7c515e" providerId="ADAL" clId="{75016F44-512C-5341-99A4-0515FCFC0FB3}" dt="2019-10-26T08:06:21.965" v="1124" actId="20577"/>
+        <pc:chgData name="Akash Levy" userId="0f662538-7453-45f3-952a-fc9f1a7c515e" providerId="ADAL" clId="{75016F44-512C-5341-99A4-0515FCFC0FB3}" dt="2019-10-26T08:20:35.755" v="1248" actId="207"/>
         <pc:sldMkLst>
           <pc:docMk/>
           <pc:sldMk cId="735790947" sldId="258"/>
@@ -252,7 +252,7 @@
           </ac:spMkLst>
         </pc:spChg>
         <pc:spChg chg="mod">
-          <ac:chgData name="Akash Levy" userId="0f662538-7453-45f3-952a-fc9f1a7c515e" providerId="ADAL" clId="{75016F44-512C-5341-99A4-0515FCFC0FB3}" dt="2019-10-26T08:06:21.965" v="1124" actId="20577"/>
+          <ac:chgData name="Akash Levy" userId="0f662538-7453-45f3-952a-fc9f1a7c515e" providerId="ADAL" clId="{75016F44-512C-5341-99A4-0515FCFC0FB3}" dt="2019-10-26T08:20:35.755" v="1248" actId="207"/>
           <ac:spMkLst>
             <pc:docMk/>
             <pc:sldMk cId="735790947" sldId="258"/>
@@ -530,7 +530,7 @@
         </pc:spChg>
       </pc:sldChg>
       <pc:sldChg chg="addSp delSp modSp add">
-        <pc:chgData name="Akash Levy" userId="0f662538-7453-45f3-952a-fc9f1a7c515e" providerId="ADAL" clId="{75016F44-512C-5341-99A4-0515FCFC0FB3}" dt="2019-10-26T08:14:53.640" v="1210" actId="931"/>
+        <pc:chgData name="Akash Levy" userId="0f662538-7453-45f3-952a-fc9f1a7c515e" providerId="ADAL" clId="{75016F44-512C-5341-99A4-0515FCFC0FB3}" dt="2019-10-26T08:22:38.430" v="1281" actId="207"/>
         <pc:sldMkLst>
           <pc:docMk/>
           <pc:sldMk cId="3428824198" sldId="267"/>
@@ -544,7 +544,7 @@
           </ac:spMkLst>
         </pc:spChg>
         <pc:spChg chg="mod">
-          <ac:chgData name="Akash Levy" userId="0f662538-7453-45f3-952a-fc9f1a7c515e" providerId="ADAL" clId="{75016F44-512C-5341-99A4-0515FCFC0FB3}" dt="2019-10-26T08:13:49.220" v="1209" actId="20577"/>
+          <ac:chgData name="Akash Levy" userId="0f662538-7453-45f3-952a-fc9f1a7c515e" providerId="ADAL" clId="{75016F44-512C-5341-99A4-0515FCFC0FB3}" dt="2019-10-26T08:22:38.430" v="1281" actId="207"/>
           <ac:spMkLst>
             <pc:docMk/>
             <pc:sldMk cId="3428824198" sldId="267"/>
@@ -5993,12 +5993,40 @@
                       </a:rPr>
                       <m:t>=</m:t>
                     </m:r>
+                    <m:r>
+                      <a:rPr lang="en-US" sz="1200" b="0" i="0" smtClean="0">
+                        <a:solidFill>
+                          <a:srgbClr val="00B050"/>
+                        </a:solidFill>
+                        <a:latin typeface="Cambria Math" panose="02040503050406030204" pitchFamily="18" charset="0"/>
+                        <a:ea typeface="Cambria Math" panose="02040503050406030204" pitchFamily="18" charset="0"/>
+                      </a:rPr>
+                      <m:t>137.88 </m:t>
+                    </m:r>
+                    <m:r>
+                      <m:rPr>
+                        <m:sty m:val="p"/>
+                      </m:rPr>
+                      <a:rPr lang="en-US" sz="1200" b="0" i="0" smtClean="0">
+                        <a:solidFill>
+                          <a:srgbClr val="00B050"/>
+                        </a:solidFill>
+                        <a:latin typeface="Cambria Math" panose="02040503050406030204" pitchFamily="18" charset="0"/>
+                        <a:ea typeface="Cambria Math" panose="02040503050406030204" pitchFamily="18" charset="0"/>
+                      </a:rPr>
+                      <m:t>Hz</m:t>
+                    </m:r>
                   </m:oMath>
                 </a14:m>
                 <a:r>
-                  <a:rPr lang="en-US" sz="1200" dirty="0"/>
+                  <a:rPr lang="en-US" sz="1200" dirty="0">
+                    <a:solidFill>
+                      <a:srgbClr val="00B050"/>
+                    </a:solidFill>
+                  </a:rPr>
                   <a:t> </a:t>
                 </a:r>
+                <a:endParaRPr lang="en-US" sz="1200" dirty="0"/>
               </a:p>
               <a:p>
                 <a:pPr marL="0"/>
@@ -6262,9 +6290,36 @@
                       </a:rPr>
                       <m:t>=</m:t>
                     </m:r>
+                    <m:r>
+                      <a:rPr lang="en-US" sz="1200" b="0" i="0" smtClean="0">
+                        <a:solidFill>
+                          <a:srgbClr val="00B050"/>
+                        </a:solidFill>
+                        <a:latin typeface="Cambria Math" panose="02040503050406030204" pitchFamily="18" charset="0"/>
+                        <a:ea typeface="Cambria Math" panose="02040503050406030204" pitchFamily="18" charset="0"/>
+                      </a:rPr>
+                      <m:t>147.78 </m:t>
+                    </m:r>
+                    <m:r>
+                      <m:rPr>
+                        <m:sty m:val="p"/>
+                      </m:rPr>
+                      <a:rPr lang="en-US" sz="1200" b="0" i="0" smtClean="0">
+                        <a:solidFill>
+                          <a:srgbClr val="00B050"/>
+                        </a:solidFill>
+                        <a:latin typeface="Cambria Math" panose="02040503050406030204" pitchFamily="18" charset="0"/>
+                        <a:ea typeface="Cambria Math" panose="02040503050406030204" pitchFamily="18" charset="0"/>
+                      </a:rPr>
+                      <m:t>Hz</m:t>
+                    </m:r>
                   </m:oMath>
                 </a14:m>
-                <a:endParaRPr lang="en-US" sz="2000" b="1" dirty="0"/>
+                <a:endParaRPr lang="en-US" sz="2000" b="1" dirty="0">
+                  <a:solidFill>
+                    <a:srgbClr val="00B050"/>
+                  </a:solidFill>
+                </a:endParaRPr>
               </a:p>
               <a:p>
                 <a:pPr marL="0"/>
@@ -6527,6 +6582,29 @@
                         <a:ea typeface="Cambria Math" panose="02040503050406030204" pitchFamily="18" charset="0"/>
                       </a:rPr>
                       <m:t>=</m:t>
+                    </m:r>
+                    <m:r>
+                      <a:rPr lang="en-US" sz="1200" b="0" i="0" smtClean="0">
+                        <a:solidFill>
+                          <a:srgbClr val="00B050"/>
+                        </a:solidFill>
+                        <a:latin typeface="Cambria Math" panose="02040503050406030204" pitchFamily="18" charset="0"/>
+                        <a:ea typeface="Cambria Math" panose="02040503050406030204" pitchFamily="18" charset="0"/>
+                      </a:rPr>
+                      <m:t>434.23 </m:t>
+                    </m:r>
+                    <m:r>
+                      <m:rPr>
+                        <m:sty m:val="p"/>
+                      </m:rPr>
+                      <a:rPr lang="en-US" sz="1200" b="0" i="0" smtClean="0">
+                        <a:solidFill>
+                          <a:srgbClr val="00B050"/>
+                        </a:solidFill>
+                        <a:latin typeface="Cambria Math" panose="02040503050406030204" pitchFamily="18" charset="0"/>
+                        <a:ea typeface="Cambria Math" panose="02040503050406030204" pitchFamily="18" charset="0"/>
+                      </a:rPr>
+                      <m:t>Hz</m:t>
                     </m:r>
                   </m:oMath>
                 </a14:m>
@@ -8177,6 +8255,29 @@
                       </a:rPr>
                       <m:t>=</m:t>
                     </m:r>
+                    <m:r>
+                      <a:rPr lang="en-US" sz="1200" b="0" i="0" smtClean="0">
+                        <a:solidFill>
+                          <a:srgbClr val="00B050"/>
+                        </a:solidFill>
+                        <a:latin typeface="Cambria Math" panose="02040503050406030204" pitchFamily="18" charset="0"/>
+                        <a:ea typeface="Cambria Math" panose="02040503050406030204" pitchFamily="18" charset="0"/>
+                      </a:rPr>
+                      <m:t>58 </m:t>
+                    </m:r>
+                    <m:r>
+                      <m:rPr>
+                        <m:sty m:val="p"/>
+                      </m:rPr>
+                      <a:rPr lang="en-US" sz="1200" b="0" i="0" smtClean="0">
+                        <a:solidFill>
+                          <a:srgbClr val="00B050"/>
+                        </a:solidFill>
+                        <a:latin typeface="Cambria Math" panose="02040503050406030204" pitchFamily="18" charset="0"/>
+                        <a:ea typeface="Cambria Math" panose="02040503050406030204" pitchFamily="18" charset="0"/>
+                      </a:rPr>
+                      <m:t>Hz</m:t>
+                    </m:r>
                   </m:oMath>
                 </a14:m>
                 <a:endParaRPr lang="en-US" sz="1200" dirty="0"/>
@@ -8443,6 +8544,29 @@
                       </a:rPr>
                       <m:t>=</m:t>
                     </m:r>
+                    <m:r>
+                      <a:rPr lang="en-US" sz="1200" b="0" i="0" smtClean="0">
+                        <a:solidFill>
+                          <a:srgbClr val="00B050"/>
+                        </a:solidFill>
+                        <a:latin typeface="Cambria Math" panose="02040503050406030204" pitchFamily="18" charset="0"/>
+                        <a:ea typeface="Cambria Math" panose="02040503050406030204" pitchFamily="18" charset="0"/>
+                      </a:rPr>
+                      <m:t>68.56 </m:t>
+                    </m:r>
+                    <m:r>
+                      <m:rPr>
+                        <m:sty m:val="p"/>
+                      </m:rPr>
+                      <a:rPr lang="en-US" sz="1200" b="0" i="0" smtClean="0">
+                        <a:solidFill>
+                          <a:srgbClr val="00B050"/>
+                        </a:solidFill>
+                        <a:latin typeface="Cambria Math" panose="02040503050406030204" pitchFamily="18" charset="0"/>
+                        <a:ea typeface="Cambria Math" panose="02040503050406030204" pitchFamily="18" charset="0"/>
+                      </a:rPr>
+                      <m:t>Hz</m:t>
+                    </m:r>
                   </m:oMath>
                 </a14:m>
                 <a:endParaRPr lang="en-US" sz="2000" b="1" dirty="0"/>
@@ -8693,14 +8817,50 @@
                       </m:e>
                     </m:rad>
                     <m:r>
-                      <a:rPr lang="en-US" sz="1200" b="0" i="1" smtClean="0">
+                      <a:rPr lang="en-US" sz="1200" i="1">
                         <a:latin typeface="Cambria Math" panose="02040503050406030204" pitchFamily="18" charset="0"/>
                         <a:ea typeface="Cambria Math" panose="02040503050406030204" pitchFamily="18" charset="0"/>
                       </a:rPr>
                       <m:t>=</m:t>
+                    </m:r>
+                    <m:r>
+                      <a:rPr lang="en-US" sz="1200" i="0" smtClean="0">
+                        <a:solidFill>
+                          <a:srgbClr val="00B050"/>
+                        </a:solidFill>
+                        <a:latin typeface="Cambria Math" panose="02040503050406030204" pitchFamily="18" charset="0"/>
+                        <a:ea typeface="Cambria Math" panose="02040503050406030204" pitchFamily="18" charset="0"/>
+                      </a:rPr>
+                      <m:t>166.69</m:t>
+                    </m:r>
+                    <m:r>
+                      <a:rPr lang="en-US" sz="1200" b="0" i="0" smtClean="0">
+                        <a:solidFill>
+                          <a:srgbClr val="00B050"/>
+                        </a:solidFill>
+                        <a:latin typeface="Cambria Math" panose="02040503050406030204" pitchFamily="18" charset="0"/>
+                        <a:ea typeface="Cambria Math" panose="02040503050406030204" pitchFamily="18" charset="0"/>
+                      </a:rPr>
+                      <m:t> </m:t>
+                    </m:r>
+                    <m:r>
+                      <m:rPr>
+                        <m:sty m:val="p"/>
+                      </m:rPr>
+                      <a:rPr lang="en-US" sz="1200" b="0" i="0" smtClean="0">
+                        <a:solidFill>
+                          <a:srgbClr val="00B050"/>
+                        </a:solidFill>
+                        <a:latin typeface="Cambria Math" panose="02040503050406030204" pitchFamily="18" charset="0"/>
+                        <a:ea typeface="Cambria Math" panose="02040503050406030204" pitchFamily="18" charset="0"/>
+                      </a:rPr>
+                      <m:t>Hz</m:t>
                     </m:r>
                   </m:oMath>
                 </a14:m>
+              </a:p>
+              <a:p>
+                <a:pPr marL="914400" lvl="2"/>
                 <a:endParaRPr lang="en-US" sz="1200" dirty="0"/>
               </a:p>
               <a:p>

</xml_diff>